<commit_message>
Update Psy524-03-Intro to Matrices.pptx
</commit_message>
<xml_diff>
--- a/Slides/Psy524-03-Intro to Matrices.pptx
+++ b/Slides/Psy524-03-Intro to Matrices.pptx
@@ -239,7 +239,7 @@
           <a:p>
             <a:fld id="{005B8273-E34D-4EC8-A524-C922C7D26CF4}" type="datetimeFigureOut">
               <a:rPr lang="en-US" smtClean="0"/>
-              <a:t>1/22/2019</a:t>
+              <a:t>1/29/2019</a:t>
             </a:fld>
             <a:endParaRPr lang="en-US"/>
           </a:p>
@@ -877,7 +877,7 @@
           <a:p>
             <a:fld id="{D06296A4-0BC5-4D86-A5EC-8E0AD97E67C4}" type="datetime1">
               <a:rPr lang="en-US" smtClean="0"/>
-              <a:t>1/22/2019</a:t>
+              <a:t>1/29/2019</a:t>
             </a:fld>
             <a:endParaRPr lang="en-US"/>
           </a:p>
@@ -1051,7 +1051,7 @@
           <a:p>
             <a:fld id="{B303338C-74E4-4C73-BC74-32E7AC67316F}" type="datetime1">
               <a:rPr lang="en-US" smtClean="0"/>
-              <a:t>1/22/2019</a:t>
+              <a:t>1/29/2019</a:t>
             </a:fld>
             <a:endParaRPr lang="en-US"/>
           </a:p>
@@ -1199,7 +1199,7 @@
           <a:p>
             <a:fld id="{39379DA7-6800-4C8F-960C-ACEF94707DAF}" type="datetime1">
               <a:rPr lang="en-US" smtClean="0"/>
-              <a:t>1/22/2019</a:t>
+              <a:t>1/29/2019</a:t>
             </a:fld>
             <a:endParaRPr lang="en-US"/>
           </a:p>
@@ -1485,7 +1485,7 @@
           <a:p>
             <a:fld id="{0321C684-A1BD-4240-B32B-D3383ED15D38}" type="datetime1">
               <a:rPr lang="en-US" smtClean="0"/>
-              <a:t>1/22/2019</a:t>
+              <a:t>1/29/2019</a:t>
             </a:fld>
             <a:endParaRPr lang="en-US"/>
           </a:p>
@@ -1828,7 +1828,7 @@
           <a:p>
             <a:fld id="{E3B89F17-1308-43FA-9242-B63B13B23B31}" type="datetime1">
               <a:rPr lang="en-US" smtClean="0"/>
-              <a:t>1/22/2019</a:t>
+              <a:t>1/29/2019</a:t>
             </a:fld>
             <a:endParaRPr lang="en-US"/>
           </a:p>
@@ -2111,7 +2111,7 @@
           <a:p>
             <a:fld id="{AD94586C-BE15-4AF2-8293-61F3E8A8888A}" type="datetime1">
               <a:rPr lang="en-US" smtClean="0"/>
-              <a:t>1/22/2019</a:t>
+              <a:t>1/29/2019</a:t>
             </a:fld>
             <a:endParaRPr lang="en-US"/>
           </a:p>
@@ -2572,7 +2572,7 @@
           <a:p>
             <a:fld id="{EC10978C-DFF0-4B80-B20F-F79424CDD589}" type="datetime1">
               <a:rPr lang="en-US" smtClean="0"/>
-              <a:t>1/22/2019</a:t>
+              <a:t>1/29/2019</a:t>
             </a:fld>
             <a:endParaRPr lang="en-US"/>
           </a:p>
@@ -2685,7 +2685,7 @@
           <a:p>
             <a:fld id="{5F30BB44-A3C0-48C6-A2D9-E9723CA7344E}" type="datetime1">
               <a:rPr lang="en-US" smtClean="0"/>
-              <a:t>1/22/2019</a:t>
+              <a:t>1/29/2019</a:t>
             </a:fld>
             <a:endParaRPr lang="en-US"/>
           </a:p>
@@ -2776,7 +2776,7 @@
           <a:p>
             <a:fld id="{A3CE3911-7BE7-4087-9EE1-B794A99AE660}" type="datetime1">
               <a:rPr lang="en-US" smtClean="0"/>
-              <a:t>1/22/2019</a:t>
+              <a:t>1/29/2019</a:t>
             </a:fld>
             <a:endParaRPr lang="en-US"/>
           </a:p>
@@ -3032,7 +3032,7 @@
           <a:p>
             <a:fld id="{FD2FF0E6-0B43-4B52-A582-7ED11B7051E7}" type="datetime1">
               <a:rPr lang="en-US" smtClean="0"/>
-              <a:t>1/22/2019</a:t>
+              <a:t>1/29/2019</a:t>
             </a:fld>
             <a:endParaRPr lang="en-US"/>
           </a:p>
@@ -3435,7 +3435,7 @@
           <a:p>
             <a:fld id="{5161CE22-373F-4D49-84BA-8C2FE787EC63}" type="datetime1">
               <a:rPr lang="en-US" smtClean="0"/>
-              <a:t>1/22/2019</a:t>
+              <a:t>1/29/2019</a:t>
             </a:fld>
             <a:endParaRPr lang="en-US"/>
           </a:p>
@@ -3919,7 +3919,7 @@
           <a:p>
             <a:fld id="{4D9A0568-1764-4E88-876D-0397D4DFA98C}" type="datetime1">
               <a:rPr lang="en-US" smtClean="0"/>
-              <a:t>1/22/2019</a:t>
+              <a:t>1/29/2019</a:t>
             </a:fld>
             <a:endParaRPr lang="en-US"/>
           </a:p>
@@ -4562,7 +4562,7 @@
           <a:graphicData uri="http://schemas.openxmlformats.org/presentationml/2006/ole">
             <mc:AlternateContent xmlns:mc="http://schemas.openxmlformats.org/markup-compatibility/2006">
               <mc:Choice xmlns:v="urn:schemas-microsoft-com:vml" Requires="v">
-                <p:oleObj spid="_x0000_s21527" name="Equation" r:id="rId3" imgW="863280" imgH="241200" progId="Equation.DSMT4">
+                <p:oleObj spid="_x0000_s21529" name="Equation" r:id="rId3" imgW="863280" imgH="241200" progId="Equation.DSMT4">
                   <p:embed/>
                 </p:oleObj>
               </mc:Choice>
@@ -4725,7 +4725,7 @@
           <a:graphicData uri="http://schemas.openxmlformats.org/presentationml/2006/ole">
             <mc:AlternateContent xmlns:mc="http://schemas.openxmlformats.org/markup-compatibility/2006">
               <mc:Choice xmlns:v="urn:schemas-microsoft-com:vml" Requires="v">
-                <p:oleObj spid="_x0000_s22552" name="Equation" r:id="rId4" imgW="2819160" imgH="2730240" progId="Equation.DSMT4">
+                <p:oleObj spid="_x0000_s22554" name="Equation" r:id="rId4" imgW="2819160" imgH="2730240" progId="Equation.DSMT4">
                   <p:embed/>
                 </p:oleObj>
               </mc:Choice>
@@ -6161,7 +6161,7 @@
           <a:graphicData uri="http://schemas.openxmlformats.org/presentationml/2006/ole">
             <mc:AlternateContent xmlns:mc="http://schemas.openxmlformats.org/markup-compatibility/2006">
               <mc:Choice xmlns:v="urn:schemas-microsoft-com:vml" Requires="v">
-                <p:oleObj spid="_x0000_s23562" name="Equation" r:id="rId3" imgW="1320480" imgH="939600" progId="Equation.DSMT4">
+                <p:oleObj spid="_x0000_s23564" name="Equation" r:id="rId3" imgW="1320480" imgH="939600" progId="Equation.DSMT4">
                   <p:embed/>
                 </p:oleObj>
               </mc:Choice>
@@ -6512,7 +6512,7 @@
           <a:graphicData uri="http://schemas.openxmlformats.org/presentationml/2006/ole">
             <mc:AlternateContent xmlns:mc="http://schemas.openxmlformats.org/markup-compatibility/2006">
               <mc:Choice xmlns:v="urn:schemas-microsoft-com:vml" Requires="v">
-                <p:oleObj spid="_x0000_s24586" name="Equation" r:id="rId3" imgW="2920680" imgH="1244520" progId="Equation.DSMT4">
+                <p:oleObj spid="_x0000_s24588" name="Equation" r:id="rId3" imgW="2920680" imgH="1244520" progId="Equation.DSMT4">
                   <p:embed/>
                 </p:oleObj>
               </mc:Choice>
@@ -6842,7 +6842,7 @@
           <a:graphicData uri="http://schemas.openxmlformats.org/presentationml/2006/ole">
             <mc:AlternateContent xmlns:mc="http://schemas.openxmlformats.org/markup-compatibility/2006">
               <mc:Choice xmlns:v="urn:schemas-microsoft-com:vml" Requires="v">
-                <p:oleObj spid="_x0000_s25610" name="Equation" r:id="rId3" imgW="4470120" imgH="2438280" progId="Equation.DSMT4">
+                <p:oleObj spid="_x0000_s25612" name="Equation" r:id="rId3" imgW="4470120" imgH="2438280" progId="Equation.DSMT4">
                   <p:embed/>
                 </p:oleObj>
               </mc:Choice>
@@ -7163,7 +7163,7 @@
           <a:graphicData uri="http://schemas.openxmlformats.org/presentationml/2006/ole">
             <mc:AlternateContent xmlns:mc="http://schemas.openxmlformats.org/markup-compatibility/2006">
               <mc:Choice xmlns:v="urn:schemas-microsoft-com:vml" Requires="v">
-                <p:oleObj spid="_x0000_s26634" name="Equation" r:id="rId3" imgW="2628720" imgH="304560" progId="Equation.DSMT4">
+                <p:oleObj spid="_x0000_s26636" name="Equation" r:id="rId3" imgW="2628720" imgH="304560" progId="Equation.DSMT4">
                   <p:embed/>
                 </p:oleObj>
               </mc:Choice>
@@ -7339,7 +7339,7 @@
           <a:graphicData uri="http://schemas.openxmlformats.org/presentationml/2006/ole">
             <mc:AlternateContent xmlns:mc="http://schemas.openxmlformats.org/markup-compatibility/2006">
               <mc:Choice xmlns:v="urn:schemas-microsoft-com:vml" Requires="v">
-                <p:oleObj spid="_x0000_s27658" name="Equation" r:id="rId3" imgW="2552400" imgH="2577960" progId="Equation.DSMT4">
+                <p:oleObj spid="_x0000_s27660" name="Equation" r:id="rId3" imgW="2552400" imgH="2577960" progId="Equation.DSMT4">
                   <p:embed/>
                 </p:oleObj>
               </mc:Choice>
@@ -7533,7 +7533,7 @@
           <a:graphicData uri="http://schemas.openxmlformats.org/presentationml/2006/ole">
             <mc:AlternateContent xmlns:mc="http://schemas.openxmlformats.org/markup-compatibility/2006">
               <mc:Choice xmlns:v="urn:schemas-microsoft-com:vml" Requires="v">
-                <p:oleObj spid="_x0000_s1051" name="Equation" r:id="rId3" imgW="1511280" imgH="711000" progId="Equation.DSMT4">
+                <p:oleObj spid="_x0000_s1053" name="Equation" r:id="rId3" imgW="1511280" imgH="711000" progId="Equation.DSMT4">
                   <p:embed/>
                 </p:oleObj>
               </mc:Choice>
@@ -7776,7 +7776,7 @@
           <a:graphicData uri="http://schemas.openxmlformats.org/presentationml/2006/ole">
             <mc:AlternateContent xmlns:mc="http://schemas.openxmlformats.org/markup-compatibility/2006">
               <mc:Choice xmlns:v="urn:schemas-microsoft-com:vml" Requires="v">
-                <p:oleObj spid="_x0000_s28682" name="Equation" r:id="rId3" imgW="2349360" imgH="457200" progId="Equation.DSMT4">
+                <p:oleObj spid="_x0000_s28684" name="Equation" r:id="rId3" imgW="2349360" imgH="457200" progId="Equation.DSMT4">
                   <p:embed/>
                 </p:oleObj>
               </mc:Choice>
@@ -7907,7 +7907,7 @@
           <a:graphicData uri="http://schemas.openxmlformats.org/presentationml/2006/ole">
             <mc:AlternateContent xmlns:mc="http://schemas.openxmlformats.org/markup-compatibility/2006">
               <mc:Choice xmlns:v="urn:schemas-microsoft-com:vml" Requires="v">
-                <p:oleObj spid="_x0000_s2144" name="Equation" r:id="rId3" imgW="1511300" imgH="711200" progId="Equation.DSMT4">
+                <p:oleObj spid="_x0000_s2152" name="Equation" r:id="rId3" imgW="1511300" imgH="711200" progId="Equation.DSMT4">
                   <p:embed/>
                 </p:oleObj>
               </mc:Choice>
@@ -7983,7 +7983,7 @@
           <a:graphicData uri="http://schemas.openxmlformats.org/presentationml/2006/ole">
             <mc:AlternateContent xmlns:mc="http://schemas.openxmlformats.org/markup-compatibility/2006">
               <mc:Choice xmlns:v="urn:schemas-microsoft-com:vml" Requires="v">
-                <p:oleObj spid="_x0000_s2145" name="Equation" r:id="rId5" imgW="990360" imgH="711000" progId="Equation.DSMT4">
+                <p:oleObj spid="_x0000_s2153" name="Equation" r:id="rId5" imgW="990360" imgH="711000" progId="Equation.DSMT4">
                   <p:embed/>
                 </p:oleObj>
               </mc:Choice>
@@ -8059,7 +8059,7 @@
           <a:graphicData uri="http://schemas.openxmlformats.org/presentationml/2006/ole">
             <mc:AlternateContent xmlns:mc="http://schemas.openxmlformats.org/markup-compatibility/2006">
               <mc:Choice xmlns:v="urn:schemas-microsoft-com:vml" Requires="v">
-                <p:oleObj spid="_x0000_s2146" name="Equation" r:id="rId7" imgW="863280" imgH="914400" progId="Equation.DSMT4">
+                <p:oleObj spid="_x0000_s2154" name="Equation" r:id="rId7" imgW="863280" imgH="914400" progId="Equation.DSMT4">
                   <p:embed/>
                 </p:oleObj>
               </mc:Choice>
@@ -8129,7 +8129,7 @@
           <a:graphicData uri="http://schemas.openxmlformats.org/presentationml/2006/ole">
             <mc:AlternateContent xmlns:mc="http://schemas.openxmlformats.org/markup-compatibility/2006">
               <mc:Choice xmlns:v="urn:schemas-microsoft-com:vml" Requires="v">
-                <p:oleObj spid="_x0000_s2147" name="Equation" r:id="rId9" imgW="558720" imgH="291960" progId="Equation.DSMT4">
+                <p:oleObj spid="_x0000_s2155" name="Equation" r:id="rId9" imgW="558720" imgH="291960" progId="Equation.DSMT4">
                   <p:embed/>
                 </p:oleObj>
               </mc:Choice>
@@ -8334,7 +8334,7 @@
           <a:graphicData uri="http://schemas.openxmlformats.org/presentationml/2006/ole">
             <mc:AlternateContent xmlns:mc="http://schemas.openxmlformats.org/markup-compatibility/2006">
               <mc:Choice xmlns:v="urn:schemas-microsoft-com:vml" Requires="v">
-                <p:oleObj spid="_x0000_s16427" name="Equation" r:id="rId3" imgW="990360" imgH="711000" progId="Equation.DSMT4">
+                <p:oleObj spid="_x0000_s16431" name="Equation" r:id="rId3" imgW="990360" imgH="711000" progId="Equation.DSMT4">
                   <p:embed/>
                 </p:oleObj>
               </mc:Choice>
@@ -8404,7 +8404,7 @@
           <a:graphicData uri="http://schemas.openxmlformats.org/presentationml/2006/ole">
             <mc:AlternateContent xmlns:mc="http://schemas.openxmlformats.org/markup-compatibility/2006">
               <mc:Choice xmlns:v="urn:schemas-microsoft-com:vml" Requires="v">
-                <p:oleObj spid="_x0000_s16428" name="Equation" r:id="rId5" imgW="1942920" imgH="914400" progId="Equation.DSMT4">
+                <p:oleObj spid="_x0000_s16432" name="Equation" r:id="rId5" imgW="1942920" imgH="914400" progId="Equation.DSMT4">
                   <p:embed/>
                 </p:oleObj>
               </mc:Choice>
@@ -8615,7 +8615,7 @@
           <a:graphicData uri="http://schemas.openxmlformats.org/presentationml/2006/ole">
             <mc:AlternateContent xmlns:mc="http://schemas.openxmlformats.org/markup-compatibility/2006">
               <mc:Choice xmlns:v="urn:schemas-microsoft-com:vml" Requires="v">
-                <p:oleObj spid="_x0000_s17474" name="Equation" r:id="rId3" imgW="558720" imgH="291960" progId="Equation.DSMT4">
+                <p:oleObj spid="_x0000_s17480" name="Equation" r:id="rId3" imgW="558720" imgH="291960" progId="Equation.DSMT4">
                   <p:embed/>
                 </p:oleObj>
               </mc:Choice>
@@ -8691,7 +8691,7 @@
           <a:graphicData uri="http://schemas.openxmlformats.org/presentationml/2006/ole">
             <mc:AlternateContent xmlns:mc="http://schemas.openxmlformats.org/markup-compatibility/2006">
               <mc:Choice xmlns:v="urn:schemas-microsoft-com:vml" Requires="v">
-                <p:oleObj spid="_x0000_s17475" name="Equation" r:id="rId5" imgW="774360" imgH="711000" progId="Equation.DSMT4">
+                <p:oleObj spid="_x0000_s17481" name="Equation" r:id="rId5" imgW="774360" imgH="711000" progId="Equation.DSMT4">
                   <p:embed/>
                 </p:oleObj>
               </mc:Choice>
@@ -8761,7 +8761,7 @@
           <a:graphicData uri="http://schemas.openxmlformats.org/presentationml/2006/ole">
             <mc:AlternateContent xmlns:mc="http://schemas.openxmlformats.org/markup-compatibility/2006">
               <mc:Choice xmlns:v="urn:schemas-microsoft-com:vml" Requires="v">
-                <p:oleObj spid="_x0000_s17476" name="Equation" r:id="rId7" imgW="977760" imgH="711000" progId="Equation.DSMT4">
+                <p:oleObj spid="_x0000_s17482" name="Equation" r:id="rId7" imgW="977760" imgH="711000" progId="Equation.DSMT4">
                   <p:embed/>
                 </p:oleObj>
               </mc:Choice>
@@ -9044,7 +9044,7 @@
           <a:graphicData uri="http://schemas.openxmlformats.org/presentationml/2006/ole">
             <mc:AlternateContent xmlns:mc="http://schemas.openxmlformats.org/markup-compatibility/2006">
               <mc:Choice xmlns:v="urn:schemas-microsoft-com:vml" Requires="v">
-                <p:oleObj spid="_x0000_s18474" name="Equation" r:id="rId3" imgW="2120760" imgH="914400" progId="Equation.DSMT4">
+                <p:oleObj spid="_x0000_s18478" name="Equation" r:id="rId3" imgW="2120760" imgH="914400" progId="Equation.DSMT4">
                   <p:embed/>
                 </p:oleObj>
               </mc:Choice>
@@ -9114,7 +9114,7 @@
           <a:graphicData uri="http://schemas.openxmlformats.org/presentationml/2006/ole">
             <mc:AlternateContent xmlns:mc="http://schemas.openxmlformats.org/markup-compatibility/2006">
               <mc:Choice xmlns:v="urn:schemas-microsoft-com:vml" Requires="v">
-                <p:oleObj spid="_x0000_s18475" name="Equation" r:id="rId5" imgW="2882880" imgH="914400" progId="Equation.DSMT4">
+                <p:oleObj spid="_x0000_s18479" name="Equation" r:id="rId5" imgW="2882880" imgH="914400" progId="Equation.DSMT4">
                   <p:embed/>
                 </p:oleObj>
               </mc:Choice>
@@ -9684,7 +9684,7 @@
           <a:graphicData uri="http://schemas.openxmlformats.org/presentationml/2006/ole">
             <mc:AlternateContent xmlns:mc="http://schemas.openxmlformats.org/markup-compatibility/2006">
               <mc:Choice xmlns:v="urn:schemas-microsoft-com:vml" Requires="v">
-                <p:oleObj spid="_x0000_s19478" name="Equation" r:id="rId3" imgW="4431960" imgH="1650960" progId="Equation.DSMT4">
+                <p:oleObj spid="_x0000_s19480" name="Equation" r:id="rId3" imgW="4431960" imgH="1650960" progId="Equation.DSMT4">
                   <p:embed/>
                 </p:oleObj>
               </mc:Choice>
@@ -9847,7 +9847,7 @@
           <a:graphicData uri="http://schemas.openxmlformats.org/presentationml/2006/ole">
             <mc:AlternateContent xmlns:mc="http://schemas.openxmlformats.org/markup-compatibility/2006">
               <mc:Choice xmlns:v="urn:schemas-microsoft-com:vml" Requires="v">
-                <p:oleObj spid="_x0000_s20502" name="Equation" r:id="rId3" imgW="2565360" imgH="939600" progId="Equation.DSMT4">
+                <p:oleObj spid="_x0000_s20504" name="Equation" r:id="rId3" imgW="2565360" imgH="939600" progId="Equation.DSMT4">
                   <p:embed/>
                 </p:oleObj>
               </mc:Choice>

</xml_diff>